<commit_message>
Fix sequence diagram for status
</commit_message>
<xml_diff>
--- a/docs/diagrams/StatusSequenceDiagram.pptx
+++ b/docs/diagrams/StatusSequenceDiagram.pptx
@@ -261,7 +261,7 @@
           <a:p>
             <a:fld id="{A105535C-AC3D-4F7B-9806-020C9529C48E}" type="datetimeFigureOut">
               <a:rPr lang="en-SG" smtClean="0"/>
-              <a:t>11/11/2018</a:t>
+              <a:t>12/11/2018</a:t>
             </a:fld>
             <a:endParaRPr lang="en-SG"/>
           </a:p>
@@ -461,7 +461,7 @@
           <a:p>
             <a:fld id="{A105535C-AC3D-4F7B-9806-020C9529C48E}" type="datetimeFigureOut">
               <a:rPr lang="en-SG" smtClean="0"/>
-              <a:t>11/11/2018</a:t>
+              <a:t>12/11/2018</a:t>
             </a:fld>
             <a:endParaRPr lang="en-SG"/>
           </a:p>
@@ -671,7 +671,7 @@
           <a:p>
             <a:fld id="{A105535C-AC3D-4F7B-9806-020C9529C48E}" type="datetimeFigureOut">
               <a:rPr lang="en-SG" smtClean="0"/>
-              <a:t>11/11/2018</a:t>
+              <a:t>12/11/2018</a:t>
             </a:fld>
             <a:endParaRPr lang="en-SG"/>
           </a:p>
@@ -871,7 +871,7 @@
           <a:p>
             <a:fld id="{A105535C-AC3D-4F7B-9806-020C9529C48E}" type="datetimeFigureOut">
               <a:rPr lang="en-SG" smtClean="0"/>
-              <a:t>11/11/2018</a:t>
+              <a:t>12/11/2018</a:t>
             </a:fld>
             <a:endParaRPr lang="en-SG"/>
           </a:p>
@@ -1147,7 +1147,7 @@
           <a:p>
             <a:fld id="{A105535C-AC3D-4F7B-9806-020C9529C48E}" type="datetimeFigureOut">
               <a:rPr lang="en-SG" smtClean="0"/>
-              <a:t>11/11/2018</a:t>
+              <a:t>12/11/2018</a:t>
             </a:fld>
             <a:endParaRPr lang="en-SG"/>
           </a:p>
@@ -1415,7 +1415,7 @@
           <a:p>
             <a:fld id="{A105535C-AC3D-4F7B-9806-020C9529C48E}" type="datetimeFigureOut">
               <a:rPr lang="en-SG" smtClean="0"/>
-              <a:t>11/11/2018</a:t>
+              <a:t>12/11/2018</a:t>
             </a:fld>
             <a:endParaRPr lang="en-SG"/>
           </a:p>
@@ -1830,7 +1830,7 @@
           <a:p>
             <a:fld id="{A105535C-AC3D-4F7B-9806-020C9529C48E}" type="datetimeFigureOut">
               <a:rPr lang="en-SG" smtClean="0"/>
-              <a:t>11/11/2018</a:t>
+              <a:t>12/11/2018</a:t>
             </a:fld>
             <a:endParaRPr lang="en-SG"/>
           </a:p>
@@ -1972,7 +1972,7 @@
           <a:p>
             <a:fld id="{A105535C-AC3D-4F7B-9806-020C9529C48E}" type="datetimeFigureOut">
               <a:rPr lang="en-SG" smtClean="0"/>
-              <a:t>11/11/2018</a:t>
+              <a:t>12/11/2018</a:t>
             </a:fld>
             <a:endParaRPr lang="en-SG"/>
           </a:p>
@@ -2085,7 +2085,7 @@
           <a:p>
             <a:fld id="{A105535C-AC3D-4F7B-9806-020C9529C48E}" type="datetimeFigureOut">
               <a:rPr lang="en-SG" smtClean="0"/>
-              <a:t>11/11/2018</a:t>
+              <a:t>12/11/2018</a:t>
             </a:fld>
             <a:endParaRPr lang="en-SG"/>
           </a:p>
@@ -2398,7 +2398,7 @@
           <a:p>
             <a:fld id="{A105535C-AC3D-4F7B-9806-020C9529C48E}" type="datetimeFigureOut">
               <a:rPr lang="en-SG" smtClean="0"/>
-              <a:t>11/11/2018</a:t>
+              <a:t>12/11/2018</a:t>
             </a:fld>
             <a:endParaRPr lang="en-SG"/>
           </a:p>
@@ -2687,7 +2687,7 @@
           <a:p>
             <a:fld id="{A105535C-AC3D-4F7B-9806-020C9529C48E}" type="datetimeFigureOut">
               <a:rPr lang="en-SG" smtClean="0"/>
-              <a:t>11/11/2018</a:t>
+              <a:t>12/11/2018</a:t>
             </a:fld>
             <a:endParaRPr lang="en-SG"/>
           </a:p>
@@ -2930,7 +2930,7 @@
           <a:p>
             <a:fld id="{A105535C-AC3D-4F7B-9806-020C9529C48E}" type="datetimeFigureOut">
               <a:rPr lang="en-SG" smtClean="0"/>
-              <a:t>11/11/2018</a:t>
+              <a:t>12/11/2018</a:t>
             </a:fld>
             <a:endParaRPr lang="en-SG"/>
           </a:p>
@@ -6284,8 +6284,8 @@
         </p:nvSpPr>
         <p:spPr>
           <a:xfrm>
-            <a:off x="9926989" y="5629449"/>
-            <a:ext cx="235784" cy="463892"/>
+            <a:off x="9926989" y="5757587"/>
+            <a:ext cx="248622" cy="335753"/>
           </a:xfrm>
           <a:prstGeom prst="rect">
             <a:avLst/>

</xml_diff>